<commit_message>
Updates to repeat animations
</commit_message>
<xml_diff>
--- a/Docs/DDD-2023-Oct-High-performance-graphics.pptx
+++ b/Docs/DDD-2023-Oct-High-performance-graphics.pptx
@@ -5,7 +5,7 @@
     <p:sldMasterId id="2147483675" r:id="rId1"/>
   </p:sldMasterIdLst>
   <p:notesMasterIdLst>
-    <p:notesMasterId r:id="rId13"/>
+    <p:notesMasterId r:id="rId12"/>
   </p:notesMasterIdLst>
   <p:sldIdLst>
     <p:sldId id="257" r:id="rId2"/>
@@ -14,11 +14,10 @@
     <p:sldId id="260" r:id="rId5"/>
     <p:sldId id="278" r:id="rId6"/>
     <p:sldId id="281" r:id="rId7"/>
-    <p:sldId id="286" r:id="rId8"/>
-    <p:sldId id="284" r:id="rId9"/>
-    <p:sldId id="287" r:id="rId10"/>
-    <p:sldId id="267" r:id="rId11"/>
-    <p:sldId id="268" r:id="rId12"/>
+    <p:sldId id="284" r:id="rId8"/>
+    <p:sldId id="287" r:id="rId9"/>
+    <p:sldId id="267" r:id="rId10"/>
+    <p:sldId id="268" r:id="rId11"/>
   </p:sldIdLst>
   <p:sldSz cx="12192000" cy="6858000"/>
   <p:notesSz cx="6858000" cy="9144000"/>
@@ -132,7 +131,6 @@
             <p14:sldId id="260"/>
             <p14:sldId id="278"/>
             <p14:sldId id="281"/>
-            <p14:sldId id="286"/>
             <p14:sldId id="284"/>
             <p14:sldId id="287"/>
           </p14:sldIdLst>
@@ -245,7 +243,7 @@
           <a:p>
             <a:fld id="{3DCF3C46-6ED0-491C-8B43-3B7409D70B45}" type="datetimeFigureOut">
               <a:rPr lang="en-US" smtClean="0"/>
-              <a:t>10/20/2023</a:t>
+              <a:t>10/26/2023</a:t>
             </a:fld>
             <a:endParaRPr lang="en-US"/>
           </a:p>
@@ -854,7 +852,7 @@
           <a:p>
             <a:fld id="{54795C56-C8D4-4C74-AF48-B5414D68FC4F}" type="slidenum">
               <a:rPr lang="en-US" smtClean="0"/>
-              <a:t>9</a:t>
+              <a:t>8</a:t>
             </a:fld>
             <a:endParaRPr lang="en-US"/>
           </a:p>
@@ -5198,248 +5196,6 @@
       </p:grpSpPr>
       <p:sp>
         <p:nvSpPr>
-          <p:cNvPr id="6" name="Title 5">
-            <a:extLst>
-              <a:ext uri="{FF2B5EF4-FFF2-40B4-BE49-F238E27FC236}">
-                <a16:creationId xmlns:a16="http://schemas.microsoft.com/office/drawing/2014/main" id="{42E2B464-E73F-D1D8-AB6A-869C77806B07}"/>
-              </a:ext>
-            </a:extLst>
-          </p:cNvPr>
-          <p:cNvSpPr>
-            <a:spLocks noGrp="1"/>
-          </p:cNvSpPr>
-          <p:nvPr>
-            <p:ph type="title"/>
-          </p:nvPr>
-        </p:nvSpPr>
-        <p:spPr/>
-        <p:txBody>
-          <a:bodyPr/>
-          <a:lstStyle/>
-          <a:p>
-            <a:r>
-              <a:rPr lang="en-US" dirty="0"/>
-              <a:t>Review</a:t>
-            </a:r>
-          </a:p>
-        </p:txBody>
-      </p:sp>
-      <p:sp>
-        <p:nvSpPr>
-          <p:cNvPr id="2" name="Text Placeholder 1">
-            <a:extLst>
-              <a:ext uri="{FF2B5EF4-FFF2-40B4-BE49-F238E27FC236}">
-                <a16:creationId xmlns:a16="http://schemas.microsoft.com/office/drawing/2014/main" id="{1D0D7711-9CD8-D003-36EF-31BD20F73726}"/>
-              </a:ext>
-            </a:extLst>
-          </p:cNvPr>
-          <p:cNvSpPr>
-            <a:spLocks noGrp="1"/>
-          </p:cNvSpPr>
-          <p:nvPr>
-            <p:ph type="body" idx="1"/>
-          </p:nvPr>
-        </p:nvSpPr>
-        <p:spPr/>
-        <p:txBody>
-          <a:bodyPr/>
-          <a:lstStyle/>
-          <a:p>
-            <a:r>
-              <a:rPr lang="en-US"/>
-              <a:t>Session Takeaways</a:t>
-            </a:r>
-          </a:p>
-        </p:txBody>
-      </p:sp>
-      <p:sp>
-        <p:nvSpPr>
-          <p:cNvPr id="7" name="Content Placeholder 6">
-            <a:extLst>
-              <a:ext uri="{FF2B5EF4-FFF2-40B4-BE49-F238E27FC236}">
-                <a16:creationId xmlns:a16="http://schemas.microsoft.com/office/drawing/2014/main" id="{F421855A-2193-8FF3-08F6-5F657DCF2544}"/>
-              </a:ext>
-            </a:extLst>
-          </p:cNvPr>
-          <p:cNvSpPr>
-            <a:spLocks noGrp="1"/>
-          </p:cNvSpPr>
-          <p:nvPr>
-            <p:ph sz="half" idx="2"/>
-          </p:nvPr>
-        </p:nvSpPr>
-        <p:spPr/>
-        <p:txBody>
-          <a:bodyPr/>
-          <a:lstStyle/>
-          <a:p>
-            <a:r>
-              <a:rPr lang="en-US" dirty="0"/>
-              <a:t>Consider Uno Platform</a:t>
-            </a:r>
-          </a:p>
-          <a:p>
-            <a:r>
-              <a:rPr lang="en-US" dirty="0"/>
-              <a:t>Consider </a:t>
-            </a:r>
-            <a:r>
-              <a:rPr lang="en-US" dirty="0" err="1"/>
-              <a:t>SkiaSharp</a:t>
-            </a:r>
-            <a:endParaRPr lang="en-US" dirty="0"/>
-          </a:p>
-          <a:p>
-            <a:endParaRPr lang="en-US" dirty="0"/>
-          </a:p>
-        </p:txBody>
-      </p:sp>
-      <p:sp>
-        <p:nvSpPr>
-          <p:cNvPr id="3" name="Text Placeholder 2">
-            <a:extLst>
-              <a:ext uri="{FF2B5EF4-FFF2-40B4-BE49-F238E27FC236}">
-                <a16:creationId xmlns:a16="http://schemas.microsoft.com/office/drawing/2014/main" id="{CF36B202-2E61-0922-CFD3-8A669D11C6FA}"/>
-              </a:ext>
-            </a:extLst>
-          </p:cNvPr>
-          <p:cNvSpPr>
-            <a:spLocks noGrp="1"/>
-          </p:cNvSpPr>
-          <p:nvPr>
-            <p:ph type="body" sz="quarter" idx="3"/>
-          </p:nvPr>
-        </p:nvSpPr>
-        <p:spPr>
-          <a:xfrm>
-            <a:off x="4848446" y="1694345"/>
-            <a:ext cx="5183188" cy="823912"/>
-          </a:xfrm>
-        </p:spPr>
-        <p:txBody>
-          <a:bodyPr/>
-          <a:lstStyle/>
-          <a:p>
-            <a:r>
-              <a:rPr lang="en-US" dirty="0"/>
-              <a:t>Session Resources</a:t>
-            </a:r>
-          </a:p>
-        </p:txBody>
-      </p:sp>
-      <p:sp>
-        <p:nvSpPr>
-          <p:cNvPr id="4" name="Content Placeholder 3">
-            <a:extLst>
-              <a:ext uri="{FF2B5EF4-FFF2-40B4-BE49-F238E27FC236}">
-                <a16:creationId xmlns:a16="http://schemas.microsoft.com/office/drawing/2014/main" id="{0265BC9D-E337-03B7-8390-DFAB8142E47D}"/>
-              </a:ext>
-            </a:extLst>
-          </p:cNvPr>
-          <p:cNvSpPr>
-            <a:spLocks noGrp="1"/>
-          </p:cNvSpPr>
-          <p:nvPr>
-            <p:ph sz="quarter" idx="4"/>
-          </p:nvPr>
-        </p:nvSpPr>
-        <p:spPr>
-          <a:xfrm>
-            <a:off x="4848447" y="2505075"/>
-            <a:ext cx="6506941" cy="3684588"/>
-          </a:xfrm>
-        </p:spPr>
-        <p:txBody>
-          <a:bodyPr/>
-          <a:lstStyle/>
-          <a:p>
-            <a:r>
-              <a:rPr lang="en-US" dirty="0">
-                <a:hlinkClick r:id="rId2"/>
-              </a:rPr>
-              <a:t>https://platform.uno</a:t>
-            </a:r>
-            <a:endParaRPr lang="en-US" dirty="0"/>
-          </a:p>
-          <a:p>
-            <a:r>
-              <a:rPr lang="en-US" dirty="0">
-                <a:hlinkClick r:id="rId3"/>
-              </a:rPr>
-              <a:t>https://github.com/mono/SkiaSharp</a:t>
-            </a:r>
-            <a:endParaRPr lang="en-US" dirty="0"/>
-          </a:p>
-          <a:p>
-            <a:r>
-              <a:rPr lang="en-US" dirty="0"/>
-              <a:t>Sample code </a:t>
-            </a:r>
-          </a:p>
-          <a:p>
-            <a:endParaRPr lang="en-US" sz="2400" dirty="0">
-              <a:gradFill flip="none" rotWithShape="1">
-                <a:gsLst>
-                  <a:gs pos="0">
-                    <a:schemeClr val="accent2">
-                      <a:lumMod val="40000"/>
-                      <a:lumOff val="60000"/>
-                    </a:schemeClr>
-                  </a:gs>
-                  <a:gs pos="46000">
-                    <a:schemeClr val="accent2">
-                      <a:lumMod val="95000"/>
-                      <a:lumOff val="5000"/>
-                    </a:schemeClr>
-                  </a:gs>
-                  <a:gs pos="100000">
-                    <a:schemeClr val="accent2">
-                      <a:lumMod val="60000"/>
-                    </a:schemeClr>
-                  </a:gs>
-                </a:gsLst>
-                <a:lin ang="2700000" scaled="1"/>
-                <a:tileRect/>
-              </a:gradFill>
-            </a:endParaRPr>
-          </a:p>
-          <a:p>
-            <a:endParaRPr lang="en-US" dirty="0"/>
-          </a:p>
-        </p:txBody>
-      </p:sp>
-    </p:spTree>
-    <p:extLst>
-      <p:ext uri="{BB962C8B-B14F-4D97-AF65-F5344CB8AC3E}">
-        <p14:creationId xmlns:p14="http://schemas.microsoft.com/office/powerpoint/2010/main" val="63663070"/>
-      </p:ext>
-    </p:extLst>
-  </p:cSld>
-  <p:clrMapOvr>
-    <a:masterClrMapping/>
-  </p:clrMapOvr>
-</p:sld>
-</file>
-
-<file path=ppt/slides/slide11.xml><?xml version="1.0" encoding="utf-8"?>
-<p:sld xmlns:a="http://schemas.openxmlformats.org/drawingml/2006/main" xmlns:r="http://schemas.openxmlformats.org/officeDocument/2006/relationships" xmlns:p="http://schemas.openxmlformats.org/presentationml/2006/main">
-  <p:cSld>
-    <p:spTree>
-      <p:nvGrpSpPr>
-        <p:cNvPr id="1" name=""/>
-        <p:cNvGrpSpPr/>
-        <p:nvPr/>
-      </p:nvGrpSpPr>
-      <p:grpSpPr>
-        <a:xfrm>
-          <a:off x="0" y="0"/>
-          <a:ext cx="0" cy="0"/>
-          <a:chOff x="0" y="0"/>
-          <a:chExt cx="0" cy="0"/>
-        </a:xfrm>
-      </p:grpSpPr>
-      <p:sp>
-        <p:nvSpPr>
           <p:cNvPr id="7" name="Subtitle 6">
             <a:extLst>
               <a:ext uri="{FF2B5EF4-FFF2-40B4-BE49-F238E27FC236}">
@@ -6307,11 +6063,48 @@
               <a:rPr lang="en-US" sz="2800" dirty="0">
                 <a:hlinkClick r:id="rId3"/>
               </a:rPr>
-              <a:t>https://bit.ly/winui-src</a:t>
-            </a:r>
+              <a:t>http://bit.ly/skiauno-src</a:t>
+            </a:r>
+            <a:r>
+              <a:rPr lang="en-US" sz="2800" dirty="0"/>
+              <a:t> </a:t>
+            </a:r>
+            <a:endParaRPr lang="en-US" sz="2800" dirty="0">
+              <a:hlinkClick r:id="rId4"/>
+            </a:endParaRPr>
           </a:p>
         </p:txBody>
       </p:sp>
+      <p:pic>
+        <p:nvPicPr>
+          <p:cNvPr id="4" name="Picture 3">
+            <a:extLst>
+              <a:ext uri="{FF2B5EF4-FFF2-40B4-BE49-F238E27FC236}">
+                <a16:creationId xmlns:a16="http://schemas.microsoft.com/office/drawing/2014/main" id="{AFCAE7E1-CA95-B254-4058-72C9324F8087}"/>
+              </a:ext>
+            </a:extLst>
+          </p:cNvPr>
+          <p:cNvPicPr>
+            <a:picLocks noChangeAspect="1"/>
+          </p:cNvPicPr>
+          <p:nvPr/>
+        </p:nvPicPr>
+        <p:blipFill>
+          <a:blip r:embed="rId5"/>
+          <a:stretch>
+            <a:fillRect/>
+          </a:stretch>
+        </p:blipFill>
+        <p:spPr>
+          <a:xfrm>
+            <a:off x="8143986" y="3844167"/>
+            <a:ext cx="2346806" cy="2332796"/>
+          </a:xfrm>
+          <a:prstGeom prst="rect">
+            <a:avLst/>
+          </a:prstGeom>
+        </p:spPr>
+      </p:pic>
     </p:spTree>
     <p:extLst>
       <p:ext uri="{BB962C8B-B14F-4D97-AF65-F5344CB8AC3E}">
@@ -6751,10 +6544,10 @@
       </p:grpSpPr>
       <p:sp>
         <p:nvSpPr>
-          <p:cNvPr id="2" name="Title 1">
+          <p:cNvPr id="7" name="Subtitle 6">
             <a:extLst>
               <a:ext uri="{FF2B5EF4-FFF2-40B4-BE49-F238E27FC236}">
-                <a16:creationId xmlns:a16="http://schemas.microsoft.com/office/drawing/2014/main" id="{18569099-19F9-5EF5-600A-CF2622915CD3}"/>
+                <a16:creationId xmlns:a16="http://schemas.microsoft.com/office/drawing/2014/main" id="{825C34CF-5918-68B3-79D8-F439980D9967}"/>
               </a:ext>
             </a:extLst>
           </p:cNvPr>
@@ -6762,7 +6555,7 @@
             <a:spLocks noGrp="1"/>
           </p:cNvSpPr>
           <p:nvPr>
-            <p:ph type="title"/>
+            <p:ph type="subTitle" idx="1"/>
           </p:nvPr>
         </p:nvSpPr>
         <p:spPr/>
@@ -6772,49 +6565,124 @@
           <a:p>
             <a:r>
               <a:rPr lang="en-US" dirty="0"/>
-              <a:t>Retained Mode vs. Immediate Mode</a:t>
-            </a:r>
+              <a:t>Creating a Pie Chart</a:t>
+            </a:r>
+          </a:p>
+          <a:p>
+            <a:endParaRPr lang="en-US" dirty="0"/>
           </a:p>
         </p:txBody>
       </p:sp>
       <p:sp>
         <p:nvSpPr>
-          <p:cNvPr id="3" name="Content Placeholder 2">
+          <p:cNvPr id="2" name="TextBox 1">
             <a:extLst>
               <a:ext uri="{FF2B5EF4-FFF2-40B4-BE49-F238E27FC236}">
-                <a16:creationId xmlns:a16="http://schemas.microsoft.com/office/drawing/2014/main" id="{BF58FA1B-18C2-8137-43AB-DA00B4C7676F}"/>
+                <a16:creationId xmlns:a16="http://schemas.microsoft.com/office/drawing/2014/main" id="{ED39E668-1501-FE6B-13FA-A0C9FD7F2394}"/>
               </a:ext>
             </a:extLst>
           </p:cNvPr>
-          <p:cNvSpPr>
-            <a:spLocks noGrp="1"/>
-          </p:cNvSpPr>
-          <p:nvPr>
-            <p:ph idx="1"/>
-          </p:nvPr>
+          <p:cNvSpPr txBox="1"/>
+          <p:nvPr/>
         </p:nvSpPr>
-        <p:spPr/>
+        <p:spPr>
+          <a:xfrm>
+            <a:off x="838200" y="5402798"/>
+            <a:ext cx="9383829" cy="523220"/>
+          </a:xfrm>
+          <a:prstGeom prst="rect">
+            <a:avLst/>
+          </a:prstGeom>
+          <a:noFill/>
+        </p:spPr>
         <p:txBody>
-          <a:bodyPr/>
+          <a:bodyPr wrap="square">
+            <a:spAutoFit/>
+          </a:bodyPr>
           <a:lstStyle/>
           <a:p>
             <a:r>
-              <a:rPr lang="en-US" dirty="0"/>
-              <a:t>A retained-mode API is declarative. The application constructs a scene from graphics primitives, such as shapes and lines.</a:t>
-            </a:r>
-          </a:p>
-          <a:p>
-            <a:r>
-              <a:rPr lang="en-US" dirty="0"/>
-              <a:t>An immediate-mode API is procedural. Each time a new frame is drawn, the application directly issues the drawing commands</a:t>
-            </a:r>
+              <a:rPr lang="en-US" sz="2400" dirty="0">
+                <a:gradFill flip="none" rotWithShape="1">
+                  <a:gsLst>
+                    <a:gs pos="0">
+                      <a:schemeClr val="accent2">
+                        <a:lumMod val="40000"/>
+                        <a:lumOff val="60000"/>
+                      </a:schemeClr>
+                    </a:gs>
+                    <a:gs pos="46000">
+                      <a:schemeClr val="accent2">
+                        <a:lumMod val="95000"/>
+                        <a:lumOff val="5000"/>
+                      </a:schemeClr>
+                    </a:gs>
+                    <a:gs pos="100000">
+                      <a:schemeClr val="accent2">
+                        <a:lumMod val="60000"/>
+                      </a:schemeClr>
+                    </a:gs>
+                  </a:gsLst>
+                  <a:lin ang="2700000" scaled="1"/>
+                  <a:tileRect/>
+                </a:gradFill>
+              </a:rPr>
+              <a:t>Source code available at</a:t>
+            </a:r>
+            <a:r>
+              <a:rPr lang="en-US" sz="2800" dirty="0"/>
+              <a:t>: </a:t>
+            </a:r>
+            <a:r>
+              <a:rPr lang="en-US" sz="2800" dirty="0">
+                <a:hlinkClick r:id="rId2"/>
+              </a:rPr>
+              <a:t>http://bit.ly/skiauno-src</a:t>
+            </a:r>
+            <a:r>
+              <a:rPr lang="en-US" sz="2800" dirty="0"/>
+              <a:t> </a:t>
+            </a:r>
+            <a:endParaRPr lang="en-US" sz="2800" dirty="0">
+              <a:hlinkClick r:id="rId3"/>
+            </a:endParaRPr>
           </a:p>
         </p:txBody>
       </p:sp>
+      <p:pic>
+        <p:nvPicPr>
+          <p:cNvPr id="3" name="Picture 2">
+            <a:extLst>
+              <a:ext uri="{FF2B5EF4-FFF2-40B4-BE49-F238E27FC236}">
+                <a16:creationId xmlns:a16="http://schemas.microsoft.com/office/drawing/2014/main" id="{4020088B-0987-A37C-3293-8383DFE6A5DD}"/>
+              </a:ext>
+            </a:extLst>
+          </p:cNvPr>
+          <p:cNvPicPr>
+            <a:picLocks noChangeAspect="1"/>
+          </p:cNvPicPr>
+          <p:nvPr/>
+        </p:nvPicPr>
+        <p:blipFill>
+          <a:blip r:embed="rId4"/>
+          <a:stretch>
+            <a:fillRect/>
+          </a:stretch>
+        </p:blipFill>
+        <p:spPr>
+          <a:xfrm>
+            <a:off x="8143986" y="3844167"/>
+            <a:ext cx="2346806" cy="2332796"/>
+          </a:xfrm>
+          <a:prstGeom prst="rect">
+            <a:avLst/>
+          </a:prstGeom>
+        </p:spPr>
+      </p:pic>
     </p:spTree>
     <p:extLst>
       <p:ext uri="{BB962C8B-B14F-4D97-AF65-F5344CB8AC3E}">
-        <p14:creationId xmlns:p14="http://schemas.microsoft.com/office/powerpoint/2010/main" val="2860229962"/>
+        <p14:creationId xmlns:p14="http://schemas.microsoft.com/office/powerpoint/2010/main" val="893936192"/>
       </p:ext>
     </p:extLst>
   </p:cSld>
@@ -6843,10 +6711,10 @@
       </p:grpSpPr>
       <p:sp>
         <p:nvSpPr>
-          <p:cNvPr id="7" name="Subtitle 6">
+          <p:cNvPr id="6" name="Title 5">
             <a:extLst>
               <a:ext uri="{FF2B5EF4-FFF2-40B4-BE49-F238E27FC236}">
-                <a16:creationId xmlns:a16="http://schemas.microsoft.com/office/drawing/2014/main" id="{825C34CF-5918-68B3-79D8-F439980D9967}"/>
+                <a16:creationId xmlns:a16="http://schemas.microsoft.com/office/drawing/2014/main" id="{42E2B464-E73F-D1D8-AB6A-869C77806B07}"/>
               </a:ext>
             </a:extLst>
           </p:cNvPr>
@@ -6854,7 +6722,7 @@
             <a:spLocks noGrp="1"/>
           </p:cNvSpPr>
           <p:nvPr>
-            <p:ph type="subTitle" idx="1"/>
+            <p:ph type="title"/>
           </p:nvPr>
         </p:nvSpPr>
         <p:spPr/>
@@ -6864,33 +6732,148 @@
           <a:p>
             <a:r>
               <a:rPr lang="en-US" dirty="0"/>
-              <a:t>Creating a Pie Chart</a:t>
-            </a:r>
-          </a:p>
-          <a:p>
+              <a:t>Demo Outline</a:t>
+            </a:r>
+          </a:p>
+        </p:txBody>
+      </p:sp>
+      <p:sp>
+        <p:nvSpPr>
+          <p:cNvPr id="7" name="Content Placeholder 6">
+            <a:extLst>
+              <a:ext uri="{FF2B5EF4-FFF2-40B4-BE49-F238E27FC236}">
+                <a16:creationId xmlns:a16="http://schemas.microsoft.com/office/drawing/2014/main" id="{F421855A-2193-8FF3-08F6-5F657DCF2544}"/>
+              </a:ext>
+            </a:extLst>
+          </p:cNvPr>
+          <p:cNvSpPr>
+            <a:spLocks noGrp="1"/>
+          </p:cNvSpPr>
+          <p:nvPr>
+            <p:ph idx="1"/>
+          </p:nvPr>
+        </p:nvSpPr>
+        <p:spPr/>
+        <p:txBody>
+          <a:bodyPr/>
+          <a:lstStyle/>
+          <a:p>
+            <a:r>
+              <a:rPr lang="en-US" dirty="0"/>
+              <a:t>Create Uno Platform Project</a:t>
+            </a:r>
+          </a:p>
+          <a:p>
+            <a:r>
+              <a:rPr lang="en-US" dirty="0"/>
+              <a:t>Add </a:t>
+            </a:r>
+            <a:r>
+              <a:rPr lang="en-US" dirty="0" err="1"/>
+              <a:t>SkiaSharp</a:t>
+            </a:r>
+            <a:r>
+              <a:rPr lang="en-US" dirty="0"/>
+              <a:t> </a:t>
+            </a:r>
+            <a:r>
+              <a:rPr lang="en-US" dirty="0" err="1"/>
+              <a:t>nuget</a:t>
+            </a:r>
             <a:endParaRPr lang="en-US" dirty="0"/>
           </a:p>
           <a:p>
             <a:r>
               <a:rPr lang="en-US" dirty="0"/>
-              <a:t>Source code available at: </a:t>
-            </a:r>
-            <a:r>
-              <a:rPr lang="en-US" dirty="0">
-                <a:hlinkClick r:id="rId2"/>
+              <a:t>Draw a Pie Chart with </a:t>
+            </a:r>
+            <a:r>
+              <a:rPr lang="en-US" dirty="0" err="1"/>
+              <a:t>SkiaSharp</a:t>
+            </a:r>
+            <a:endParaRPr lang="en-US" dirty="0"/>
+          </a:p>
+          <a:p>
+            <a:r>
+              <a:rPr lang="en-US" dirty="0"/>
+              <a:t>Animate the Pie Chart</a:t>
+            </a:r>
+          </a:p>
+        </p:txBody>
+      </p:sp>
+      <p:sp>
+        <p:nvSpPr>
+          <p:cNvPr id="5" name="TextBox 4">
+            <a:extLst>
+              <a:ext uri="{FF2B5EF4-FFF2-40B4-BE49-F238E27FC236}">
+                <a16:creationId xmlns:a16="http://schemas.microsoft.com/office/drawing/2014/main" id="{9C3A5409-E8E8-1A67-2F8E-0117F7818243}"/>
+              </a:ext>
+            </a:extLst>
+          </p:cNvPr>
+          <p:cNvSpPr txBox="1"/>
+          <p:nvPr/>
+        </p:nvSpPr>
+        <p:spPr>
+          <a:xfrm>
+            <a:off x="838200" y="5402798"/>
+            <a:ext cx="9383829" cy="523220"/>
+          </a:xfrm>
+          <a:prstGeom prst="rect">
+            <a:avLst/>
+          </a:prstGeom>
+          <a:noFill/>
+        </p:spPr>
+        <p:txBody>
+          <a:bodyPr wrap="square">
+            <a:spAutoFit/>
+          </a:bodyPr>
+          <a:lstStyle/>
+          <a:p>
+            <a:r>
+              <a:rPr lang="en-US" sz="2400" dirty="0">
+                <a:gradFill flip="none" rotWithShape="1">
+                  <a:gsLst>
+                    <a:gs pos="0">
+                      <a:schemeClr val="accent2">
+                        <a:lumMod val="40000"/>
+                        <a:lumOff val="60000"/>
+                      </a:schemeClr>
+                    </a:gs>
+                    <a:gs pos="46000">
+                      <a:schemeClr val="accent2">
+                        <a:lumMod val="95000"/>
+                        <a:lumOff val="5000"/>
+                      </a:schemeClr>
+                    </a:gs>
+                    <a:gs pos="100000">
+                      <a:schemeClr val="accent2">
+                        <a:lumMod val="60000"/>
+                      </a:schemeClr>
+                    </a:gs>
+                  </a:gsLst>
+                  <a:lin ang="2700000" scaled="1"/>
+                  <a:tileRect/>
+                </a:gradFill>
+              </a:rPr>
+              <a:t>Source code available at</a:t>
+            </a:r>
+            <a:r>
+              <a:rPr lang="en-US" sz="2800" dirty="0"/>
+              <a:t>: </a:t>
+            </a:r>
+            <a:r>
+              <a:rPr lang="en-US" sz="2800" dirty="0">
+                <a:hlinkClick r:id="rId3"/>
               </a:rPr>
               <a:t>https://bit.ly/winui-src</a:t>
             </a:r>
-          </a:p>
-          <a:p>
-            <a:endParaRPr lang="en-US" dirty="0"/>
           </a:p>
         </p:txBody>
       </p:sp>
     </p:spTree>
     <p:extLst>
       <p:ext uri="{BB962C8B-B14F-4D97-AF65-F5344CB8AC3E}">
-        <p14:creationId xmlns:p14="http://schemas.microsoft.com/office/powerpoint/2010/main" val="893936192"/>
+        <p14:creationId xmlns:p14="http://schemas.microsoft.com/office/powerpoint/2010/main" val="619188247"/>
       </p:ext>
     </p:extLst>
   </p:cSld>
@@ -6940,7 +6923,35 @@
           <a:p>
             <a:r>
               <a:rPr lang="en-US" dirty="0"/>
-              <a:t>Demo Outline</a:t>
+              <a:t>Review</a:t>
+            </a:r>
+          </a:p>
+        </p:txBody>
+      </p:sp>
+      <p:sp>
+        <p:nvSpPr>
+          <p:cNvPr id="2" name="Text Placeholder 1">
+            <a:extLst>
+              <a:ext uri="{FF2B5EF4-FFF2-40B4-BE49-F238E27FC236}">
+                <a16:creationId xmlns:a16="http://schemas.microsoft.com/office/drawing/2014/main" id="{1D0D7711-9CD8-D003-36EF-31BD20F73726}"/>
+              </a:ext>
+            </a:extLst>
+          </p:cNvPr>
+          <p:cNvSpPr>
+            <a:spLocks noGrp="1"/>
+          </p:cNvSpPr>
+          <p:nvPr>
+            <p:ph type="body" idx="1"/>
+          </p:nvPr>
+        </p:nvSpPr>
+        <p:spPr/>
+        <p:txBody>
+          <a:bodyPr/>
+          <a:lstStyle/>
+          <a:p>
+            <a:r>
+              <a:rPr lang="en-US"/>
+              <a:t>Session Takeaways</a:t>
             </a:r>
           </a:p>
         </p:txBody>
@@ -6958,7 +6969,7 @@
             <a:spLocks noGrp="1"/>
           </p:cNvSpPr>
           <p:nvPr>
-            <p:ph idx="1"/>
+            <p:ph sz="half" idx="2"/>
           </p:nvPr>
         </p:nvSpPr>
         <p:spPr/>
@@ -6968,44 +6979,133 @@
           <a:p>
             <a:r>
               <a:rPr lang="en-US" dirty="0"/>
-              <a:t>Create Uno Platform Project</a:t>
+              <a:t>Consider Uno Platform</a:t>
             </a:r>
           </a:p>
           <a:p>
             <a:r>
               <a:rPr lang="en-US" dirty="0"/>
-              <a:t>Add </a:t>
+              <a:t>Consider </a:t>
             </a:r>
             <a:r>
               <a:rPr lang="en-US" dirty="0" err="1"/>
               <a:t>SkiaSharp</a:t>
             </a:r>
+            <a:endParaRPr lang="en-US" dirty="0"/>
+          </a:p>
+          <a:p>
+            <a:endParaRPr lang="en-US" dirty="0"/>
+          </a:p>
+        </p:txBody>
+      </p:sp>
+      <p:sp>
+        <p:nvSpPr>
+          <p:cNvPr id="3" name="Text Placeholder 2">
+            <a:extLst>
+              <a:ext uri="{FF2B5EF4-FFF2-40B4-BE49-F238E27FC236}">
+                <a16:creationId xmlns:a16="http://schemas.microsoft.com/office/drawing/2014/main" id="{CF36B202-2E61-0922-CFD3-8A669D11C6FA}"/>
+              </a:ext>
+            </a:extLst>
+          </p:cNvPr>
+          <p:cNvSpPr>
+            <a:spLocks noGrp="1"/>
+          </p:cNvSpPr>
+          <p:nvPr>
+            <p:ph type="body" sz="quarter" idx="3"/>
+          </p:nvPr>
+        </p:nvSpPr>
+        <p:spPr>
+          <a:xfrm>
+            <a:off x="4848446" y="1694345"/>
+            <a:ext cx="5183188" cy="823912"/>
+          </a:xfrm>
+        </p:spPr>
+        <p:txBody>
+          <a:bodyPr/>
+          <a:lstStyle/>
+          <a:p>
             <a:r>
               <a:rPr lang="en-US" dirty="0"/>
-              <a:t> </a:t>
-            </a:r>
-            <a:r>
-              <a:rPr lang="en-US" dirty="0" err="1"/>
-              <a:t>nuget</a:t>
+              <a:t>Session Resources</a:t>
+            </a:r>
+          </a:p>
+        </p:txBody>
+      </p:sp>
+      <p:sp>
+        <p:nvSpPr>
+          <p:cNvPr id="4" name="Content Placeholder 3">
+            <a:extLst>
+              <a:ext uri="{FF2B5EF4-FFF2-40B4-BE49-F238E27FC236}">
+                <a16:creationId xmlns:a16="http://schemas.microsoft.com/office/drawing/2014/main" id="{0265BC9D-E337-03B7-8390-DFAB8142E47D}"/>
+              </a:ext>
+            </a:extLst>
+          </p:cNvPr>
+          <p:cNvSpPr>
+            <a:spLocks noGrp="1"/>
+          </p:cNvSpPr>
+          <p:nvPr>
+            <p:ph sz="quarter" idx="4"/>
+          </p:nvPr>
+        </p:nvSpPr>
+        <p:spPr>
+          <a:xfrm>
+            <a:off x="4848447" y="2505075"/>
+            <a:ext cx="6506941" cy="3684588"/>
+          </a:xfrm>
+        </p:spPr>
+        <p:txBody>
+          <a:bodyPr/>
+          <a:lstStyle/>
+          <a:p>
+            <a:r>
+              <a:rPr lang="en-US" dirty="0">
+                <a:hlinkClick r:id="rId2"/>
+              </a:rPr>
+              <a:t>https://platform.uno</a:t>
             </a:r>
             <a:endParaRPr lang="en-US" dirty="0"/>
           </a:p>
           <a:p>
             <a:r>
-              <a:rPr lang="en-US" dirty="0"/>
-              <a:t>Draw a Pie Chart with </a:t>
-            </a:r>
-            <a:r>
-              <a:rPr lang="en-US" dirty="0" err="1"/>
-              <a:t>SkiaSharp</a:t>
+              <a:rPr lang="en-US" dirty="0">
+                <a:hlinkClick r:id="rId3"/>
+              </a:rPr>
+              <a:t>https://github.com/mono/SkiaSharp</a:t>
             </a:r>
             <a:endParaRPr lang="en-US" dirty="0"/>
           </a:p>
           <a:p>
-            <a:r>
-              <a:rPr lang="en-US" dirty="0"/>
-              <a:t>Animate the Pie Chart</a:t>
-            </a:r>
+            <a:pPr marL="0" indent="0">
+              <a:buNone/>
+            </a:pPr>
+            <a:endParaRPr lang="en-US" sz="2400" dirty="0">
+              <a:gradFill flip="none" rotWithShape="1">
+                <a:gsLst>
+                  <a:gs pos="0">
+                    <a:schemeClr val="accent2">
+                      <a:lumMod val="40000"/>
+                      <a:lumOff val="60000"/>
+                    </a:schemeClr>
+                  </a:gs>
+                  <a:gs pos="46000">
+                    <a:schemeClr val="accent2">
+                      <a:lumMod val="95000"/>
+                      <a:lumOff val="5000"/>
+                    </a:schemeClr>
+                  </a:gs>
+                  <a:gs pos="100000">
+                    <a:schemeClr val="accent2">
+                      <a:lumMod val="60000"/>
+                    </a:schemeClr>
+                  </a:gs>
+                </a:gsLst>
+                <a:lin ang="2700000" scaled="1"/>
+                <a:tileRect/>
+              </a:gradFill>
+            </a:endParaRPr>
+          </a:p>
+          <a:p>
+            <a:endParaRPr lang="en-US" dirty="0"/>
           </a:p>
         </p:txBody>
       </p:sp>
@@ -7014,7 +7114,7 @@
           <p:cNvPr id="5" name="TextBox 4">
             <a:extLst>
               <a:ext uri="{FF2B5EF4-FFF2-40B4-BE49-F238E27FC236}">
-                <a16:creationId xmlns:a16="http://schemas.microsoft.com/office/drawing/2014/main" id="{9C3A5409-E8E8-1A67-2F8E-0117F7818243}"/>
+                <a16:creationId xmlns:a16="http://schemas.microsoft.com/office/drawing/2014/main" id="{79DF5572-DBD9-069B-65E6-60402714AC62}"/>
               </a:ext>
             </a:extLst>
           </p:cNvPr>
@@ -7071,17 +7171,54 @@
             </a:r>
             <a:r>
               <a:rPr lang="en-US" sz="2800" dirty="0">
-                <a:hlinkClick r:id="rId3"/>
+                <a:hlinkClick r:id="rId4"/>
               </a:rPr>
-              <a:t>https://bit.ly/winui-src</a:t>
-            </a:r>
+              <a:t>http://bit.ly/skiauno-src</a:t>
+            </a:r>
+            <a:r>
+              <a:rPr lang="en-US" sz="2800" dirty="0"/>
+              <a:t> </a:t>
+            </a:r>
+            <a:endParaRPr lang="en-US" sz="2800" dirty="0">
+              <a:hlinkClick r:id="rId5"/>
+            </a:endParaRPr>
           </a:p>
         </p:txBody>
       </p:sp>
+      <p:pic>
+        <p:nvPicPr>
+          <p:cNvPr id="8" name="Picture 7">
+            <a:extLst>
+              <a:ext uri="{FF2B5EF4-FFF2-40B4-BE49-F238E27FC236}">
+                <a16:creationId xmlns:a16="http://schemas.microsoft.com/office/drawing/2014/main" id="{2069E74B-2CEB-2A9C-52BA-4BFD7A203A56}"/>
+              </a:ext>
+            </a:extLst>
+          </p:cNvPr>
+          <p:cNvPicPr>
+            <a:picLocks noChangeAspect="1"/>
+          </p:cNvPicPr>
+          <p:nvPr/>
+        </p:nvPicPr>
+        <p:blipFill>
+          <a:blip r:embed="rId6"/>
+          <a:stretch>
+            <a:fillRect/>
+          </a:stretch>
+        </p:blipFill>
+        <p:spPr>
+          <a:xfrm>
+            <a:off x="8143986" y="3844167"/>
+            <a:ext cx="2346806" cy="2332796"/>
+          </a:xfrm>
+          <a:prstGeom prst="rect">
+            <a:avLst/>
+          </a:prstGeom>
+        </p:spPr>
+      </p:pic>
     </p:spTree>
     <p:extLst>
       <p:ext uri="{BB962C8B-B14F-4D97-AF65-F5344CB8AC3E}">
-        <p14:creationId xmlns:p14="http://schemas.microsoft.com/office/powerpoint/2010/main" val="619188247"/>
+        <p14:creationId xmlns:p14="http://schemas.microsoft.com/office/powerpoint/2010/main" val="63663070"/>
       </p:ext>
     </p:extLst>
   </p:cSld>

</xml_diff>